<commit_message>
Updated text in Poster-POtrait. pptx
</commit_message>
<xml_diff>
--- a/Poster1-Portrait.pptx
+++ b/Poster1-Portrait.pptx
@@ -104,6 +104,11 @@
       </a:defRPr>
     </a:lvl9pPr>
   </p:defaultTextStyle>
+  <p:extLst>
+    <p:ext uri="{EFAFB233-063F-42B5-8137-9DF3F51BA10A}">
+      <p15:sldGuideLst xmlns:p15="http://schemas.microsoft.com/office/powerpoint/2012/main"/>
+    </p:ext>
+  </p:extLst>
 </p:presentation>
 </file>
 
@@ -2966,6 +2971,54 @@
           <a:chExt cx="0" cy="0"/>
         </a:xfrm>
       </p:grpSpPr>
+      <p:sp>
+        <p:nvSpPr>
+          <p:cNvPr id="2" name="TextBox 1">
+            <a:extLst>
+              <a:ext uri="{FF2B5EF4-FFF2-40B4-BE49-F238E27FC236}">
+                <a16:creationId xmlns:a16="http://schemas.microsoft.com/office/drawing/2014/main" id="{CB93E0C8-63BE-4488-B66C-6FF1B36D1908}"/>
+              </a:ext>
+            </a:extLst>
+          </p:cNvPr>
+          <p:cNvSpPr txBox="1"/>
+          <p:nvPr/>
+        </p:nvSpPr>
+        <p:spPr>
+          <a:xfrm rot="10800000" flipV="1">
+            <a:off x="12435840" y="4941332"/>
+            <a:ext cx="10698480" cy="369332"/>
+          </a:xfrm>
+          <a:prstGeom prst="rect">
+            <a:avLst/>
+          </a:prstGeom>
+          <a:noFill/>
+        </p:spPr>
+        <p:txBody>
+          <a:bodyPr wrap="square" rtlCol="0">
+            <a:spAutoFit/>
+          </a:bodyPr>
+          <a:lstStyle/>
+          <a:p>
+            <a:r>
+              <a:rPr lang="en-US" dirty="0"/>
+              <a:t>Text </a:t>
+            </a:r>
+            <a:r>
+              <a:rPr lang="en-US" dirty="0" err="1"/>
+              <a:t>jaText</a:t>
+            </a:r>
+            <a:r>
+              <a:rPr lang="en-US" dirty="0"/>
+              <a:t> has </a:t>
+            </a:r>
+            <a:r>
+              <a:rPr lang="en-US"/>
+              <a:t>been added </a:t>
+            </a:r>
+            <a:endParaRPr lang="en-US" dirty="0"/>
+          </a:p>
+        </p:txBody>
+      </p:sp>
     </p:spTree>
     <p:extLst>
       <p:ext uri="{BB962C8B-B14F-4D97-AF65-F5344CB8AC3E}">

</xml_diff>